<commit_message>
putting job post back
</commit_message>
<xml_diff>
--- a/other_graphics/idea mockup of website.pptx
+++ b/other_graphics/idea mockup of website.pptx
@@ -105,6 +105,11 @@
       </a:defRPr>
     </a:lvl9pPr>
   </p:defaultTextStyle>
+  <p:extLst>
+    <p:ext uri="{EFAFB233-063F-42B5-8137-9DF3F51BA10A}">
+      <p15:sldGuideLst xmlns:p15="http://schemas.microsoft.com/office/powerpoint/2012/main"/>
+    </p:ext>
+  </p:extLst>
 </p:presentation>
 </file>
 
@@ -239,7 +244,7 @@
           <a:p>
             <a:fld id="{866DD81E-9414-C24B-ADFC-F8C933C3BA01}" type="datetimeFigureOut">
               <a:rPr lang="en-US" smtClean="0"/>
-              <a:t>1/7/19</a:t>
+              <a:t>1/9/19</a:t>
             </a:fld>
             <a:endParaRPr lang="en-US"/>
           </a:p>
@@ -409,7 +414,7 @@
           <a:p>
             <a:fld id="{866DD81E-9414-C24B-ADFC-F8C933C3BA01}" type="datetimeFigureOut">
               <a:rPr lang="en-US" smtClean="0"/>
-              <a:t>1/7/19</a:t>
+              <a:t>1/9/19</a:t>
             </a:fld>
             <a:endParaRPr lang="en-US"/>
           </a:p>
@@ -589,7 +594,7 @@
           <a:p>
             <a:fld id="{866DD81E-9414-C24B-ADFC-F8C933C3BA01}" type="datetimeFigureOut">
               <a:rPr lang="en-US" smtClean="0"/>
-              <a:t>1/7/19</a:t>
+              <a:t>1/9/19</a:t>
             </a:fld>
             <a:endParaRPr lang="en-US"/>
           </a:p>
@@ -759,7 +764,7 @@
           <a:p>
             <a:fld id="{866DD81E-9414-C24B-ADFC-F8C933C3BA01}" type="datetimeFigureOut">
               <a:rPr lang="en-US" smtClean="0"/>
-              <a:t>1/7/19</a:t>
+              <a:t>1/9/19</a:t>
             </a:fld>
             <a:endParaRPr lang="en-US"/>
           </a:p>
@@ -1003,7 +1008,7 @@
           <a:p>
             <a:fld id="{866DD81E-9414-C24B-ADFC-F8C933C3BA01}" type="datetimeFigureOut">
               <a:rPr lang="en-US" smtClean="0"/>
-              <a:t>1/7/19</a:t>
+              <a:t>1/9/19</a:t>
             </a:fld>
             <a:endParaRPr lang="en-US"/>
           </a:p>
@@ -1235,7 +1240,7 @@
           <a:p>
             <a:fld id="{866DD81E-9414-C24B-ADFC-F8C933C3BA01}" type="datetimeFigureOut">
               <a:rPr lang="en-US" smtClean="0"/>
-              <a:t>1/7/19</a:t>
+              <a:t>1/9/19</a:t>
             </a:fld>
             <a:endParaRPr lang="en-US"/>
           </a:p>
@@ -1602,7 +1607,7 @@
           <a:p>
             <a:fld id="{866DD81E-9414-C24B-ADFC-F8C933C3BA01}" type="datetimeFigureOut">
               <a:rPr lang="en-US" smtClean="0"/>
-              <a:t>1/7/19</a:t>
+              <a:t>1/9/19</a:t>
             </a:fld>
             <a:endParaRPr lang="en-US"/>
           </a:p>
@@ -1720,7 +1725,7 @@
           <a:p>
             <a:fld id="{866DD81E-9414-C24B-ADFC-F8C933C3BA01}" type="datetimeFigureOut">
               <a:rPr lang="en-US" smtClean="0"/>
-              <a:t>1/7/19</a:t>
+              <a:t>1/9/19</a:t>
             </a:fld>
             <a:endParaRPr lang="en-US"/>
           </a:p>
@@ -1815,7 +1820,7 @@
           <a:p>
             <a:fld id="{866DD81E-9414-C24B-ADFC-F8C933C3BA01}" type="datetimeFigureOut">
               <a:rPr lang="en-US" smtClean="0"/>
-              <a:t>1/7/19</a:t>
+              <a:t>1/9/19</a:t>
             </a:fld>
             <a:endParaRPr lang="en-US"/>
           </a:p>
@@ -2092,7 +2097,7 @@
           <a:p>
             <a:fld id="{866DD81E-9414-C24B-ADFC-F8C933C3BA01}" type="datetimeFigureOut">
               <a:rPr lang="en-US" smtClean="0"/>
-              <a:t>1/7/19</a:t>
+              <a:t>1/9/19</a:t>
             </a:fld>
             <a:endParaRPr lang="en-US"/>
           </a:p>
@@ -2349,7 +2354,7 @@
           <a:p>
             <a:fld id="{866DD81E-9414-C24B-ADFC-F8C933C3BA01}" type="datetimeFigureOut">
               <a:rPr lang="en-US" smtClean="0"/>
-              <a:t>1/7/19</a:t>
+              <a:t>1/9/19</a:t>
             </a:fld>
             <a:endParaRPr lang="en-US"/>
           </a:p>
@@ -2562,7 +2567,7 @@
           <a:p>
             <a:fld id="{866DD81E-9414-C24B-ADFC-F8C933C3BA01}" type="datetimeFigureOut">
               <a:rPr lang="en-US" smtClean="0"/>
-              <a:t>1/7/19</a:t>
+              <a:t>1/9/19</a:t>
             </a:fld>
             <a:endParaRPr lang="en-US"/>
           </a:p>

</xml_diff>